<commit_message>
Adding analysis of PD towns comparison with bison areas, checking variation in clip plot biomass, organizing file structure
</commit_message>
<xml_diff>
--- a/plots/PSEMplots.pptx
+++ b/plots/PSEMplots.pptx
@@ -202,7 +202,7 @@
           <a:p>
             <a:fld id="{09007E6E-1341-4B25-B897-05406DF805DE}" type="datetimeFigureOut">
               <a:rPr lang="en-US" smtClean="0"/>
-              <a:t>10/9/2023</a:t>
+              <a:t>10/23/2024</a:t>
             </a:fld>
             <a:endParaRPr lang="en-US"/>
           </a:p>
@@ -1138,7 +1138,7 @@
           <a:p>
             <a:fld id="{87382854-844E-43E2-9B4F-1BD7657CF4C3}" type="datetimeFigureOut">
               <a:rPr lang="en-US" smtClean="0"/>
-              <a:t>10/9/2023</a:t>
+              <a:t>10/23/2024</a:t>
             </a:fld>
             <a:endParaRPr lang="en-US"/>
           </a:p>
@@ -1336,7 +1336,7 @@
           <a:p>
             <a:fld id="{87382854-844E-43E2-9B4F-1BD7657CF4C3}" type="datetimeFigureOut">
               <a:rPr lang="en-US" smtClean="0"/>
-              <a:t>10/9/2023</a:t>
+              <a:t>10/23/2024</a:t>
             </a:fld>
             <a:endParaRPr lang="en-US"/>
           </a:p>
@@ -1544,7 +1544,7 @@
           <a:p>
             <a:fld id="{87382854-844E-43E2-9B4F-1BD7657CF4C3}" type="datetimeFigureOut">
               <a:rPr lang="en-US" smtClean="0"/>
-              <a:t>10/9/2023</a:t>
+              <a:t>10/23/2024</a:t>
             </a:fld>
             <a:endParaRPr lang="en-US"/>
           </a:p>
@@ -1742,7 +1742,7 @@
           <a:p>
             <a:fld id="{87382854-844E-43E2-9B4F-1BD7657CF4C3}" type="datetimeFigureOut">
               <a:rPr lang="en-US" smtClean="0"/>
-              <a:t>10/9/2023</a:t>
+              <a:t>10/23/2024</a:t>
             </a:fld>
             <a:endParaRPr lang="en-US"/>
           </a:p>
@@ -2017,7 +2017,7 @@
           <a:p>
             <a:fld id="{87382854-844E-43E2-9B4F-1BD7657CF4C3}" type="datetimeFigureOut">
               <a:rPr lang="en-US" smtClean="0"/>
-              <a:t>10/9/2023</a:t>
+              <a:t>10/23/2024</a:t>
             </a:fld>
             <a:endParaRPr lang="en-US"/>
           </a:p>
@@ -2282,7 +2282,7 @@
           <a:p>
             <a:fld id="{87382854-844E-43E2-9B4F-1BD7657CF4C3}" type="datetimeFigureOut">
               <a:rPr lang="en-US" smtClean="0"/>
-              <a:t>10/9/2023</a:t>
+              <a:t>10/23/2024</a:t>
             </a:fld>
             <a:endParaRPr lang="en-US"/>
           </a:p>
@@ -2694,7 +2694,7 @@
           <a:p>
             <a:fld id="{87382854-844E-43E2-9B4F-1BD7657CF4C3}" type="datetimeFigureOut">
               <a:rPr lang="en-US" smtClean="0"/>
-              <a:t>10/9/2023</a:t>
+              <a:t>10/23/2024</a:t>
             </a:fld>
             <a:endParaRPr lang="en-US"/>
           </a:p>
@@ -2835,7 +2835,7 @@
           <a:p>
             <a:fld id="{87382854-844E-43E2-9B4F-1BD7657CF4C3}" type="datetimeFigureOut">
               <a:rPr lang="en-US" smtClean="0"/>
-              <a:t>10/9/2023</a:t>
+              <a:t>10/23/2024</a:t>
             </a:fld>
             <a:endParaRPr lang="en-US"/>
           </a:p>
@@ -2948,7 +2948,7 @@
           <a:p>
             <a:fld id="{87382854-844E-43E2-9B4F-1BD7657CF4C3}" type="datetimeFigureOut">
               <a:rPr lang="en-US" smtClean="0"/>
-              <a:t>10/9/2023</a:t>
+              <a:t>10/23/2024</a:t>
             </a:fld>
             <a:endParaRPr lang="en-US"/>
           </a:p>
@@ -3259,7 +3259,7 @@
           <a:p>
             <a:fld id="{87382854-844E-43E2-9B4F-1BD7657CF4C3}" type="datetimeFigureOut">
               <a:rPr lang="en-US" smtClean="0"/>
-              <a:t>10/9/2023</a:t>
+              <a:t>10/23/2024</a:t>
             </a:fld>
             <a:endParaRPr lang="en-US"/>
           </a:p>
@@ -3547,7 +3547,7 @@
           <a:p>
             <a:fld id="{87382854-844E-43E2-9B4F-1BD7657CF4C3}" type="datetimeFigureOut">
               <a:rPr lang="en-US" smtClean="0"/>
-              <a:t>10/9/2023</a:t>
+              <a:t>10/23/2024</a:t>
             </a:fld>
             <a:endParaRPr lang="en-US"/>
           </a:p>
@@ -3788,7 +3788,7 @@
           <a:p>
             <a:fld id="{87382854-844E-43E2-9B4F-1BD7657CF4C3}" type="datetimeFigureOut">
               <a:rPr lang="en-US" smtClean="0"/>
-              <a:t>10/9/2023</a:t>
+              <a:t>10/23/2024</a:t>
             </a:fld>
             <a:endParaRPr lang="en-US"/>
           </a:p>
@@ -17652,10 +17652,10 @@
       </p:grpSpPr>
       <p:grpSp>
         <p:nvGrpSpPr>
-          <p:cNvPr id="83" name="Group 82">
+          <p:cNvPr id="58" name="Group 57">
             <a:extLst>
               <a:ext uri="{FF2B5EF4-FFF2-40B4-BE49-F238E27FC236}">
-                <a16:creationId xmlns:a16="http://schemas.microsoft.com/office/drawing/2014/main" id="{5091880C-ED34-1075-43D9-CCA3335731D6}"/>
+                <a16:creationId xmlns:a16="http://schemas.microsoft.com/office/drawing/2014/main" id="{C90F3361-80AA-E2CC-38C4-3B8524FF5696}"/>
               </a:ext>
             </a:extLst>
           </p:cNvPr>
@@ -17664,10 +17664,10 @@
         </p:nvGrpSpPr>
         <p:grpSpPr>
           <a:xfrm>
-            <a:off x="-1285875" y="-285804"/>
-            <a:ext cx="17605734" cy="7212878"/>
-            <a:chOff x="-1285875" y="-285804"/>
-            <a:chExt cx="17605734" cy="7212878"/>
+            <a:off x="-1402080" y="-247391"/>
+            <a:ext cx="9128759" cy="14420594"/>
+            <a:chOff x="-1402080" y="-247391"/>
+            <a:chExt cx="9128759" cy="14420594"/>
           </a:xfrm>
         </p:grpSpPr>
         <p:sp>
@@ -17683,9 +17683,9 @@
             <p:nvPr/>
           </p:nvSpPr>
           <p:spPr>
-            <a:xfrm>
-              <a:off x="-1285875" y="-285804"/>
-              <a:ext cx="17605734" cy="7212878"/>
+            <a:xfrm rot="5400000">
+              <a:off x="-4047997" y="2398526"/>
+              <a:ext cx="14420594" cy="9128759"/>
             </a:xfrm>
             <a:prstGeom prst="rect">
               <a:avLst/>
@@ -18239,7 +18239,7 @@
           <p:spPr>
             <a:xfrm>
               <a:off x="5890491" y="3539660"/>
-              <a:ext cx="1727744" cy="1585048"/>
+              <a:ext cx="1690055" cy="1550472"/>
             </a:xfrm>
             <a:prstGeom prst="rect">
               <a:avLst/>
@@ -18330,8 +18330,8 @@
           </p:nvGrpSpPr>
           <p:grpSpPr>
             <a:xfrm>
-              <a:off x="5882528" y="5202285"/>
-              <a:ext cx="1735707" cy="1684596"/>
+              <a:off x="5882529" y="5202285"/>
+              <a:ext cx="1697628" cy="1586408"/>
               <a:chOff x="4126992" y="3096768"/>
               <a:chExt cx="2444496" cy="2164080"/>
             </a:xfrm>
@@ -19513,7 +19513,7 @@
           </p:nvCxnSpPr>
           <p:spPr>
             <a:xfrm>
-              <a:off x="8194233" y="6116351"/>
+              <a:off x="-499034" y="13391325"/>
               <a:ext cx="666725" cy="0"/>
             </a:xfrm>
             <a:prstGeom prst="line">
@@ -19554,7 +19554,7 @@
           </p:nvCxnSpPr>
           <p:spPr>
             <a:xfrm>
-              <a:off x="8211403" y="6484697"/>
+              <a:off x="-481864" y="13759671"/>
               <a:ext cx="666725" cy="0"/>
             </a:xfrm>
             <a:prstGeom prst="line">
@@ -19595,7 +19595,7 @@
           </p:nvSpPr>
           <p:spPr>
             <a:xfrm>
-              <a:off x="8860958" y="6205733"/>
+              <a:off x="167691" y="13480707"/>
               <a:ext cx="1564841" cy="523220"/>
             </a:xfrm>
             <a:prstGeom prst="rect">
@@ -19630,7 +19630,7 @@
           </p:nvSpPr>
           <p:spPr>
             <a:xfrm>
-              <a:off x="8866916" y="5850972"/>
+              <a:off x="173649" y="13125946"/>
               <a:ext cx="1564841" cy="523220"/>
             </a:xfrm>
             <a:prstGeom prst="rect">
@@ -19669,7 +19669,7 @@
           </p:nvSpPr>
           <p:spPr>
             <a:xfrm>
-              <a:off x="8070733" y="5850972"/>
+              <a:off x="-622534" y="13125946"/>
               <a:ext cx="2198451" cy="877981"/>
             </a:xfrm>
             <a:prstGeom prst="rect">
@@ -19759,7 +19759,7 @@
           </p:nvCxnSpPr>
           <p:spPr>
             <a:xfrm flipH="1" flipV="1">
-              <a:off x="11834776" y="4928628"/>
+              <a:off x="3141509" y="12203602"/>
               <a:ext cx="3027219" cy="1458598"/>
             </a:xfrm>
             <a:prstGeom prst="straightConnector1">
@@ -19804,7 +19804,7 @@
           </p:nvCxnSpPr>
           <p:spPr>
             <a:xfrm flipH="1" flipV="1">
-              <a:off x="12275379" y="2033152"/>
+              <a:off x="3582112" y="9308126"/>
               <a:ext cx="2551153" cy="3912158"/>
             </a:xfrm>
             <a:prstGeom prst="straightConnector1">
@@ -19849,7 +19849,7 @@
           </p:nvCxnSpPr>
           <p:spPr>
             <a:xfrm flipH="1" flipV="1">
-              <a:off x="9987912" y="897112"/>
+              <a:off x="1294645" y="8172086"/>
               <a:ext cx="4716950" cy="4978859"/>
             </a:xfrm>
             <a:prstGeom prst="straightConnector1">
@@ -19893,7 +19893,7 @@
           </p:nvCxnSpPr>
           <p:spPr>
             <a:xfrm flipH="1">
-              <a:off x="10640778" y="-110447"/>
+              <a:off x="1947511" y="7164527"/>
               <a:ext cx="4093723" cy="318880"/>
             </a:xfrm>
             <a:prstGeom prst="straightConnector1">
@@ -19937,7 +19937,7 @@
           </p:nvCxnSpPr>
           <p:spPr>
             <a:xfrm flipH="1" flipV="1">
-              <a:off x="10308788" y="897112"/>
+              <a:off x="1615521" y="8172086"/>
               <a:ext cx="4517744" cy="3558255"/>
             </a:xfrm>
             <a:prstGeom prst="straightConnector1">
@@ -19983,7 +19983,7 @@
           </p:nvCxnSpPr>
           <p:spPr>
             <a:xfrm flipH="1" flipV="1">
-              <a:off x="13091676" y="906779"/>
+              <a:off x="4398409" y="8181753"/>
               <a:ext cx="1663067" cy="5312188"/>
             </a:xfrm>
             <a:prstGeom prst="straightConnector1">
@@ -20027,7 +20027,7 @@
           </p:nvCxnSpPr>
           <p:spPr>
             <a:xfrm flipH="1" flipV="1">
-              <a:off x="13533069" y="877760"/>
+              <a:off x="4839802" y="8152734"/>
               <a:ext cx="1201432" cy="3796551"/>
             </a:xfrm>
             <a:prstGeom prst="straightConnector1">
@@ -20071,7 +20071,7 @@
           </p:nvCxnSpPr>
           <p:spPr>
             <a:xfrm flipH="1" flipV="1">
-              <a:off x="13818251" y="702848"/>
+              <a:off x="5124984" y="7977822"/>
               <a:ext cx="886611" cy="1272542"/>
             </a:xfrm>
             <a:prstGeom prst="straightConnector1">
@@ -20114,7 +20114,7 @@
           </p:nvSpPr>
           <p:spPr>
             <a:xfrm>
-              <a:off x="12181814" y="75782"/>
+              <a:off x="3488547" y="7350756"/>
               <a:ext cx="1819723" cy="830997"/>
             </a:xfrm>
             <a:prstGeom prst="rect">
@@ -20201,7 +20201,7 @@
           </p:nvSpPr>
           <p:spPr>
             <a:xfrm>
-              <a:off x="9333157" y="66115"/>
+              <a:off x="639890" y="7341089"/>
               <a:ext cx="1309509" cy="830997"/>
             </a:xfrm>
             <a:prstGeom prst="rect">
@@ -20283,7 +20283,7 @@
           </p:nvSpPr>
           <p:spPr>
             <a:xfrm>
-              <a:off x="11620624" y="1202155"/>
+              <a:off x="2927357" y="8477129"/>
               <a:ext cx="1309509" cy="830997"/>
             </a:xfrm>
             <a:prstGeom prst="rect">
@@ -20365,7 +20365,7 @@
           </p:nvSpPr>
           <p:spPr>
             <a:xfrm>
-              <a:off x="9333156" y="2697000"/>
+              <a:off x="639889" y="9971974"/>
               <a:ext cx="1309509" cy="830997"/>
             </a:xfrm>
             <a:prstGeom prst="rect">
@@ -20447,7 +20447,7 @@
           </p:nvSpPr>
           <p:spPr>
             <a:xfrm>
-              <a:off x="11039744" y="3492270"/>
+              <a:off x="2346477" y="10767244"/>
               <a:ext cx="1554561" cy="830997"/>
             </a:xfrm>
             <a:prstGeom prst="rect">
@@ -20537,7 +20537,7 @@
           </p:nvSpPr>
           <p:spPr>
             <a:xfrm>
-              <a:off x="10244712" y="4513129"/>
+              <a:off x="1551445" y="11788103"/>
               <a:ext cx="1590064" cy="830997"/>
             </a:xfrm>
             <a:prstGeom prst="rect">
@@ -20627,7 +20627,7 @@
           </p:nvSpPr>
           <p:spPr>
             <a:xfrm>
-              <a:off x="7949472" y="2698998"/>
+              <a:off x="-743795" y="9973972"/>
               <a:ext cx="1333450" cy="523220"/>
             </a:xfrm>
             <a:prstGeom prst="rect">
@@ -20665,7 +20665,7 @@
           </p:nvCxnSpPr>
           <p:spPr>
             <a:xfrm flipH="1" flipV="1">
-              <a:off x="10640778" y="480554"/>
+              <a:off x="1947511" y="7755528"/>
               <a:ext cx="1541036" cy="10727"/>
             </a:xfrm>
             <a:prstGeom prst="straightConnector1">
@@ -20710,7 +20710,7 @@
           </p:nvCxnSpPr>
           <p:spPr>
             <a:xfrm flipV="1">
-              <a:off x="8616197" y="906779"/>
+              <a:off x="-77070" y="8181753"/>
               <a:ext cx="896527" cy="1792219"/>
             </a:xfrm>
             <a:prstGeom prst="straightConnector1">
@@ -20754,7 +20754,7 @@
           </p:nvCxnSpPr>
           <p:spPr>
             <a:xfrm>
-              <a:off x="10535405" y="805955"/>
+              <a:off x="1842138" y="8080929"/>
               <a:ext cx="1150302" cy="519606"/>
             </a:xfrm>
             <a:prstGeom prst="straightConnector1">
@@ -20799,7 +20799,7 @@
           </p:nvCxnSpPr>
           <p:spPr>
             <a:xfrm>
-              <a:off x="9779070" y="897112"/>
+              <a:off x="1085803" y="8172086"/>
               <a:ext cx="208841" cy="1799888"/>
             </a:xfrm>
             <a:prstGeom prst="straightConnector1">
@@ -20843,7 +20843,7 @@
           </p:nvCxnSpPr>
           <p:spPr>
             <a:xfrm flipH="1">
-              <a:off x="10551267" y="1943057"/>
+              <a:off x="1858000" y="9218031"/>
               <a:ext cx="1138889" cy="848723"/>
             </a:xfrm>
             <a:prstGeom prst="straightConnector1">
@@ -20887,7 +20887,7 @@
           </p:nvCxnSpPr>
           <p:spPr>
             <a:xfrm>
-              <a:off x="10599453" y="3287789"/>
+              <a:off x="1906186" y="10562763"/>
               <a:ext cx="521258" cy="331365"/>
             </a:xfrm>
             <a:prstGeom prst="straightConnector1">
@@ -20932,7 +20932,7 @@
           </p:nvCxnSpPr>
           <p:spPr>
             <a:xfrm>
-              <a:off x="9987911" y="3527997"/>
+              <a:off x="1294644" y="10802971"/>
               <a:ext cx="536896" cy="927370"/>
             </a:xfrm>
             <a:prstGeom prst="straightConnector1">
@@ -20977,7 +20977,7 @@
           </p:nvCxnSpPr>
           <p:spPr>
             <a:xfrm>
-              <a:off x="8616197" y="3222218"/>
+              <a:off x="-77070" y="10497192"/>
               <a:ext cx="1758272" cy="1404651"/>
             </a:xfrm>
             <a:prstGeom prst="straightConnector1">
@@ -21032,8 +21032,8 @@
           </p:blipFill>
           <p:spPr>
             <a:xfrm>
-              <a:off x="14576823" y="3539660"/>
-              <a:ext cx="1727744" cy="1585048"/>
+              <a:off x="5883556" y="10814634"/>
+              <a:ext cx="1696601" cy="1556477"/>
             </a:xfrm>
             <a:prstGeom prst="rect">
               <a:avLst/>
@@ -21067,8 +21067,8 @@
           </p:blipFill>
           <p:spPr>
             <a:xfrm>
-              <a:off x="14576823" y="-172811"/>
-              <a:ext cx="1697627" cy="1586408"/>
+              <a:off x="5883556" y="7103121"/>
+              <a:ext cx="1696601" cy="1585449"/>
             </a:xfrm>
             <a:prstGeom prst="rect">
               <a:avLst/>
@@ -21102,20 +21102,90 @@
           </p:blipFill>
           <p:spPr>
             <a:xfrm>
-              <a:off x="14584395" y="1469034"/>
-              <a:ext cx="1690055" cy="1993050"/>
+              <a:off x="5891129" y="8744008"/>
+              <a:ext cx="1690054" cy="1993049"/>
             </a:xfrm>
             <a:prstGeom prst="rect">
               <a:avLst/>
             </a:prstGeom>
           </p:spPr>
         </p:pic>
+        <p:sp>
+          <p:nvSpPr>
+            <p:cNvPr id="80" name="TextBox 79">
+              <a:extLst>
+                <a:ext uri="{FF2B5EF4-FFF2-40B4-BE49-F238E27FC236}">
+                  <a16:creationId xmlns:a16="http://schemas.microsoft.com/office/drawing/2014/main" id="{726C1EFE-B750-FB6B-2354-90883BA1DB5D}"/>
+                </a:ext>
+              </a:extLst>
+            </p:cNvPr>
+            <p:cNvSpPr txBox="1"/>
+            <p:nvPr/>
+          </p:nvSpPr>
+          <p:spPr>
+            <a:xfrm>
+              <a:off x="-1202552" y="6858000"/>
+              <a:ext cx="2206230" cy="523220"/>
+            </a:xfrm>
+            <a:prstGeom prst="rect">
+              <a:avLst/>
+            </a:prstGeom>
+            <a:noFill/>
+          </p:spPr>
+          <p:txBody>
+            <a:bodyPr wrap="square" rtlCol="0">
+              <a:spAutoFit/>
+            </a:bodyPr>
+            <a:lstStyle/>
+            <a:p>
+              <a:r>
+                <a:rPr lang="en-US" sz="2800" b="1" dirty="0"/>
+                <a:t>B) Forb</a:t>
+              </a:r>
+            </a:p>
+          </p:txBody>
+        </p:sp>
+        <p:sp>
+          <p:nvSpPr>
+            <p:cNvPr id="82" name="TextBox 81">
+              <a:extLst>
+                <a:ext uri="{FF2B5EF4-FFF2-40B4-BE49-F238E27FC236}">
+                  <a16:creationId xmlns:a16="http://schemas.microsoft.com/office/drawing/2014/main" id="{9D9861D5-B00F-B53C-0BFF-D44B38206BEC}"/>
+                </a:ext>
+              </a:extLst>
+            </p:cNvPr>
+            <p:cNvSpPr txBox="1"/>
+            <p:nvPr/>
+          </p:nvSpPr>
+          <p:spPr>
+            <a:xfrm>
+              <a:off x="-572141" y="12590522"/>
+              <a:ext cx="2206230" cy="523220"/>
+            </a:xfrm>
+            <a:prstGeom prst="rect">
+              <a:avLst/>
+            </a:prstGeom>
+            <a:noFill/>
+          </p:spPr>
+          <p:txBody>
+            <a:bodyPr wrap="square" rtlCol="0">
+              <a:spAutoFit/>
+            </a:bodyPr>
+            <a:lstStyle/>
+            <a:p>
+              <a:r>
+                <a:rPr lang="en-US" sz="2800" b="1" dirty="0"/>
+                <a:t>Key</a:t>
+              </a:r>
+            </a:p>
+          </p:txBody>
+        </p:sp>
         <p:grpSp>
           <p:nvGrpSpPr>
-            <p:cNvPr id="70" name="Group 69">
-              <a:extLst>
-                <a:ext uri="{FF2B5EF4-FFF2-40B4-BE49-F238E27FC236}">
-                  <a16:creationId xmlns:a16="http://schemas.microsoft.com/office/drawing/2014/main" id="{A69008D2-56A2-6C80-3785-E8D94DF245FC}"/>
+            <p:cNvPr id="32" name="Group 31">
+              <a:extLst>
+                <a:ext uri="{FF2B5EF4-FFF2-40B4-BE49-F238E27FC236}">
+                  <a16:creationId xmlns:a16="http://schemas.microsoft.com/office/drawing/2014/main" id="{25E86476-24CB-8A4C-7383-B15328EDBB6D}"/>
                 </a:ext>
               </a:extLst>
             </p:cNvPr>
@@ -21124,18 +21194,18 @@
           </p:nvGrpSpPr>
           <p:grpSpPr>
             <a:xfrm>
-              <a:off x="14568860" y="5202285"/>
-              <a:ext cx="1705590" cy="1684596"/>
+              <a:off x="5868496" y="12467213"/>
+              <a:ext cx="1697628" cy="1586408"/>
               <a:chOff x="4126992" y="3096768"/>
               <a:chExt cx="2444496" cy="2164080"/>
             </a:xfrm>
           </p:grpSpPr>
           <p:pic>
             <p:nvPicPr>
-              <p:cNvPr id="71" name="Content Placeholder 5">
+              <p:cNvPr id="33" name="Content Placeholder 5">
                 <a:extLst>
                   <a:ext uri="{FF2B5EF4-FFF2-40B4-BE49-F238E27FC236}">
-                    <a16:creationId xmlns:a16="http://schemas.microsoft.com/office/drawing/2014/main" id="{13A5E8E8-4E24-E34C-41FF-749957AD2C27}"/>
+                    <a16:creationId xmlns:a16="http://schemas.microsoft.com/office/drawing/2014/main" id="{486AAA3F-3F62-51D7-D1A6-CBB8D90E9C17}"/>
                   </a:ext>
                 </a:extLst>
               </p:cNvPr>
@@ -21167,10 +21237,10 @@
           </p:pic>
           <p:sp>
             <p:nvSpPr>
-              <p:cNvPr id="72" name="Oval 71">
+              <p:cNvPr id="34" name="Oval 33">
                 <a:extLst>
                   <a:ext uri="{FF2B5EF4-FFF2-40B4-BE49-F238E27FC236}">
-                    <a16:creationId xmlns:a16="http://schemas.microsoft.com/office/drawing/2014/main" id="{05E9B5D9-61D1-91E8-C3F5-29EDA4E3DD23}"/>
+                    <a16:creationId xmlns:a16="http://schemas.microsoft.com/office/drawing/2014/main" id="{CCCB76A3-06FD-DBC4-36F4-23B59F47615F}"/>
                   </a:ext>
                 </a:extLst>
               </p:cNvPr>
@@ -21219,16 +21289,16 @@
           </p:sp>
           <p:cxnSp>
             <p:nvCxnSpPr>
-              <p:cNvPr id="73" name="Straight Connector 72">
+              <p:cNvPr id="55" name="Straight Connector 54">
                 <a:extLst>
                   <a:ext uri="{FF2B5EF4-FFF2-40B4-BE49-F238E27FC236}">
-                    <a16:creationId xmlns:a16="http://schemas.microsoft.com/office/drawing/2014/main" id="{96F9AEE2-C377-EC09-CBA8-FBF562A9F6FE}"/>
+                    <a16:creationId xmlns:a16="http://schemas.microsoft.com/office/drawing/2014/main" id="{926B7A4F-735E-A2E6-FF54-663618AC9574}"/>
                   </a:ext>
                 </a:extLst>
               </p:cNvPr>
               <p:cNvCxnSpPr>
-                <a:stCxn id="72" idx="7"/>
-                <a:endCxn id="72" idx="3"/>
+                <a:stCxn id="34" idx="7"/>
+                <a:endCxn id="34" idx="3"/>
               </p:cNvCxnSpPr>
               <p:nvPr/>
             </p:nvCxnSpPr>
@@ -21262,76 +21332,6 @@
             </p:style>
           </p:cxnSp>
         </p:grpSp>
-        <p:sp>
-          <p:nvSpPr>
-            <p:cNvPr id="80" name="TextBox 79">
-              <a:extLst>
-                <a:ext uri="{FF2B5EF4-FFF2-40B4-BE49-F238E27FC236}">
-                  <a16:creationId xmlns:a16="http://schemas.microsoft.com/office/drawing/2014/main" id="{726C1EFE-B750-FB6B-2354-90883BA1DB5D}"/>
-                </a:ext>
-              </a:extLst>
-            </p:cNvPr>
-            <p:cNvSpPr txBox="1"/>
-            <p:nvPr/>
-          </p:nvSpPr>
-          <p:spPr>
-            <a:xfrm>
-              <a:off x="7664974" y="-247391"/>
-              <a:ext cx="2206230" cy="523220"/>
-            </a:xfrm>
-            <a:prstGeom prst="rect">
-              <a:avLst/>
-            </a:prstGeom>
-            <a:noFill/>
-          </p:spPr>
-          <p:txBody>
-            <a:bodyPr wrap="square" rtlCol="0">
-              <a:spAutoFit/>
-            </a:bodyPr>
-            <a:lstStyle/>
-            <a:p>
-              <a:r>
-                <a:rPr lang="en-US" sz="2800" b="1" dirty="0"/>
-                <a:t>B) Forb</a:t>
-              </a:r>
-            </a:p>
-          </p:txBody>
-        </p:sp>
-        <p:sp>
-          <p:nvSpPr>
-            <p:cNvPr id="82" name="TextBox 81">
-              <a:extLst>
-                <a:ext uri="{FF2B5EF4-FFF2-40B4-BE49-F238E27FC236}">
-                  <a16:creationId xmlns:a16="http://schemas.microsoft.com/office/drawing/2014/main" id="{9D9861D5-B00F-B53C-0BFF-D44B38206BEC}"/>
-                </a:ext>
-              </a:extLst>
-            </p:cNvPr>
-            <p:cNvSpPr txBox="1"/>
-            <p:nvPr/>
-          </p:nvSpPr>
-          <p:spPr>
-            <a:xfrm>
-              <a:off x="8121126" y="5315548"/>
-              <a:ext cx="2206230" cy="523220"/>
-            </a:xfrm>
-            <a:prstGeom prst="rect">
-              <a:avLst/>
-            </a:prstGeom>
-            <a:noFill/>
-          </p:spPr>
-          <p:txBody>
-            <a:bodyPr wrap="square" rtlCol="0">
-              <a:spAutoFit/>
-            </a:bodyPr>
-            <a:lstStyle/>
-            <a:p>
-              <a:r>
-                <a:rPr lang="en-US" sz="2800" b="1" dirty="0"/>
-                <a:t>Key</a:t>
-              </a:r>
-            </a:p>
-          </p:txBody>
-        </p:sp>
       </p:grpSp>
     </p:spTree>
     <p:extLst>

</xml_diff>